<commit_message>
Updates network stack graphic to say OSI Model instead of OSI.
</commit_message>
<xml_diff>
--- a/graphics/tock-net-stack.pptx
+++ b/graphics/tock-net-stack.pptx
@@ -104,6 +104,11 @@
       </a:defRPr>
     </a:lvl9pPr>
   </p:defaultTextStyle>
+  <p:extLst>
+    <p:ext uri="{EFAFB233-063F-42B5-8137-9DF3F51BA10A}">
+      <p15:sldGuideLst xmlns:p15="http://schemas.microsoft.com/office/powerpoint/2012/main"/>
+    </p:ext>
+  </p:extLst>
 </p:presentation>
 </file>
 
@@ -238,7 +243,7 @@
           <a:p>
             <a:fld id="{FE3F78B5-7795-F244-A8A5-257957C296FC}" type="datetimeFigureOut">
               <a:rPr lang="en-US" smtClean="0"/>
-              <a:t>8/22/17</a:t>
+              <a:t>8/23/17</a:t>
             </a:fld>
             <a:endParaRPr lang="en-US"/>
           </a:p>
@@ -403,7 +408,7 @@
           <a:p>
             <a:fld id="{FE3F78B5-7795-F244-A8A5-257957C296FC}" type="datetimeFigureOut">
               <a:rPr lang="en-US" smtClean="0"/>
-              <a:t>8/22/17</a:t>
+              <a:t>8/23/17</a:t>
             </a:fld>
             <a:endParaRPr lang="en-US"/>
           </a:p>
@@ -578,7 +583,7 @@
           <a:p>
             <a:fld id="{FE3F78B5-7795-F244-A8A5-257957C296FC}" type="datetimeFigureOut">
               <a:rPr lang="en-US" smtClean="0"/>
-              <a:t>8/22/17</a:t>
+              <a:t>8/23/17</a:t>
             </a:fld>
             <a:endParaRPr lang="en-US"/>
           </a:p>
@@ -743,7 +748,7 @@
           <a:p>
             <a:fld id="{FE3F78B5-7795-F244-A8A5-257957C296FC}" type="datetimeFigureOut">
               <a:rPr lang="en-US" smtClean="0"/>
-              <a:t>8/22/17</a:t>
+              <a:t>8/23/17</a:t>
             </a:fld>
             <a:endParaRPr lang="en-US"/>
           </a:p>
@@ -984,7 +989,7 @@
           <a:p>
             <a:fld id="{FE3F78B5-7795-F244-A8A5-257957C296FC}" type="datetimeFigureOut">
               <a:rPr lang="en-US" smtClean="0"/>
-              <a:t>8/22/17</a:t>
+              <a:t>8/23/17</a:t>
             </a:fld>
             <a:endParaRPr lang="en-US"/>
           </a:p>
@@ -1211,7 +1216,7 @@
           <a:p>
             <a:fld id="{FE3F78B5-7795-F244-A8A5-257957C296FC}" type="datetimeFigureOut">
               <a:rPr lang="en-US" smtClean="0"/>
-              <a:t>8/22/17</a:t>
+              <a:t>8/23/17</a:t>
             </a:fld>
             <a:endParaRPr lang="en-US"/>
           </a:p>
@@ -1573,7 +1578,7 @@
           <a:p>
             <a:fld id="{FE3F78B5-7795-F244-A8A5-257957C296FC}" type="datetimeFigureOut">
               <a:rPr lang="en-US" smtClean="0"/>
-              <a:t>8/22/17</a:t>
+              <a:t>8/23/17</a:t>
             </a:fld>
             <a:endParaRPr lang="en-US"/>
           </a:p>
@@ -1686,7 +1691,7 @@
           <a:p>
             <a:fld id="{FE3F78B5-7795-F244-A8A5-257957C296FC}" type="datetimeFigureOut">
               <a:rPr lang="en-US" smtClean="0"/>
-              <a:t>8/22/17</a:t>
+              <a:t>8/23/17</a:t>
             </a:fld>
             <a:endParaRPr lang="en-US"/>
           </a:p>
@@ -1776,7 +1781,7 @@
           <a:p>
             <a:fld id="{FE3F78B5-7795-F244-A8A5-257957C296FC}" type="datetimeFigureOut">
               <a:rPr lang="en-US" smtClean="0"/>
-              <a:t>8/22/17</a:t>
+              <a:t>8/23/17</a:t>
             </a:fld>
             <a:endParaRPr lang="en-US"/>
           </a:p>
@@ -2048,7 +2053,7 @@
           <a:p>
             <a:fld id="{FE3F78B5-7795-F244-A8A5-257957C296FC}" type="datetimeFigureOut">
               <a:rPr lang="en-US" smtClean="0"/>
-              <a:t>8/22/17</a:t>
+              <a:t>8/23/17</a:t>
             </a:fld>
             <a:endParaRPr lang="en-US"/>
           </a:p>
@@ -2300,7 +2305,7 @@
           <a:p>
             <a:fld id="{FE3F78B5-7795-F244-A8A5-257957C296FC}" type="datetimeFigureOut">
               <a:rPr lang="en-US" smtClean="0"/>
-              <a:t>8/22/17</a:t>
+              <a:t>8/23/17</a:t>
             </a:fld>
             <a:endParaRPr lang="en-US"/>
           </a:p>
@@ -2508,7 +2513,7 @@
           <a:p>
             <a:fld id="{FE3F78B5-7795-F244-A8A5-257957C296FC}" type="datetimeFigureOut">
               <a:rPr lang="en-US" smtClean="0"/>
-              <a:t>8/22/17</a:t>
+              <a:t>8/23/17</a:t>
             </a:fld>
             <a:endParaRPr lang="en-US"/>
           </a:p>
@@ -4434,7 +4439,7 @@
                 <a:ea typeface="Source Serif Pro" charset="0"/>
                 <a:cs typeface="Source Serif Pro" charset="0"/>
               </a:rPr>
-              <a:t>OSI</a:t>
+              <a:t>OSI Model</a:t>
             </a:r>
             <a:endParaRPr lang="en-US" sz="1800" b="1" dirty="0">
               <a:latin typeface="Source Serif Pro" charset="0"/>

</xml_diff>